<commit_message>
add reference to ppt
</commit_message>
<xml_diff>
--- a/images/Time-At-Temperature-Presentation.pptx
+++ b/images/Time-At-Temperature-Presentation.pptx
@@ -28,6 +28,8 @@
     <p:sldId id="277" r:id="rId22"/>
     <p:sldId id="278" r:id="rId23"/>
     <p:sldId id="280" r:id="rId24"/>
+    <p:sldId id="281" r:id="rId25"/>
+    <p:sldId id="282" r:id="rId26"/>
   </p:sldIdLst>
   <p:sldSz cx="12192000" cy="6858000"/>
   <p:notesSz cx="6858000" cy="9144000"/>
@@ -3653,7 +3655,6 @@
               <a:rPr lang="en-US" sz="4800" dirty="0" smtClean="0"/>
               <a:t>At the end of the day, we want the time it takes to reach a degree of cure.</a:t>
             </a:r>
-            <a:endParaRPr lang="en-US" sz="4800" dirty="0" smtClean="0"/>
           </a:p>
         </p:txBody>
       </p:sp>
@@ -4896,7 +4897,6 @@
               <a:rPr lang="en-US" sz="4800" dirty="0" smtClean="0"/>
               <a:t>…but is it right?</a:t>
             </a:r>
-            <a:endParaRPr lang="en-US" sz="4800" dirty="0" smtClean="0"/>
           </a:p>
         </p:txBody>
       </p:sp>
@@ -5145,6 +5145,412 @@
     <p:extLst>
       <p:ext uri="{BB962C8B-B14F-4D97-AF65-F5344CB8AC3E}">
         <p14:creationId xmlns:p14="http://schemas.microsoft.com/office/powerpoint/2010/main" val="978562484"/>
+      </p:ext>
+    </p:extLst>
+  </p:cSld>
+  <p:clrMapOvr>
+    <a:masterClrMapping/>
+  </p:clrMapOvr>
+</p:sld>
+</file>
+
+<file path=ppt/slides/slide24.xml><?xml version="1.0" encoding="utf-8"?>
+<p:sld xmlns:a="http://schemas.openxmlformats.org/drawingml/2006/main" xmlns:r="http://schemas.openxmlformats.org/officeDocument/2006/relationships" xmlns:p="http://schemas.openxmlformats.org/presentationml/2006/main">
+  <p:cSld>
+    <p:spTree>
+      <p:nvGrpSpPr>
+        <p:cNvPr id="1" name=""/>
+        <p:cNvGrpSpPr/>
+        <p:nvPr/>
+      </p:nvGrpSpPr>
+      <p:grpSpPr>
+        <a:xfrm>
+          <a:off x="0" y="0"/>
+          <a:ext cx="0" cy="0"/>
+          <a:chOff x="0" y="0"/>
+          <a:chExt cx="0" cy="0"/>
+        </a:xfrm>
+      </p:grpSpPr>
+      <p:sp>
+        <p:nvSpPr>
+          <p:cNvPr id="6" name="TextBox 5"/>
+          <p:cNvSpPr txBox="1"/>
+          <p:nvPr/>
+        </p:nvSpPr>
+        <p:spPr>
+          <a:xfrm>
+            <a:off x="1202267" y="889000"/>
+            <a:ext cx="8737600" cy="1200329"/>
+          </a:xfrm>
+          <a:prstGeom prst="rect">
+            <a:avLst/>
+          </a:prstGeom>
+          <a:noFill/>
+        </p:spPr>
+        <p:txBody>
+          <a:bodyPr wrap="square" rtlCol="0">
+            <a:spAutoFit/>
+          </a:bodyPr>
+          <a:lstStyle/>
+          <a:p>
+            <a:pPr algn="ctr"/>
+            <a:r>
+              <a:rPr lang="en-US" sz="7200" dirty="0" smtClean="0"/>
+              <a:t>Reference:</a:t>
+            </a:r>
+            <a:endParaRPr lang="en-US" sz="7200" dirty="0"/>
+          </a:p>
+        </p:txBody>
+      </p:sp>
+      <p:sp>
+        <p:nvSpPr>
+          <p:cNvPr id="7" name="TextBox 6"/>
+          <p:cNvSpPr txBox="1"/>
+          <p:nvPr/>
+        </p:nvSpPr>
+        <p:spPr>
+          <a:xfrm>
+            <a:off x="1405467" y="2472267"/>
+            <a:ext cx="8695266" cy="2246769"/>
+          </a:xfrm>
+          <a:prstGeom prst="rect">
+            <a:avLst/>
+          </a:prstGeom>
+          <a:noFill/>
+        </p:spPr>
+        <p:txBody>
+          <a:bodyPr wrap="square" rtlCol="0">
+            <a:spAutoFit/>
+          </a:bodyPr>
+          <a:lstStyle/>
+          <a:p>
+            <a:pPr marL="228600" indent="-228600"/>
+            <a:r>
+              <a:rPr lang="en-US" sz="2800" dirty="0" err="1"/>
+              <a:t>Sbirrazzuoli</a:t>
+            </a:r>
+            <a:r>
+              <a:rPr lang="en-US" sz="2800" dirty="0"/>
+              <a:t>, Nicolas, et al. "Integral, differential and advanced </a:t>
+            </a:r>
+            <a:r>
+              <a:rPr lang="en-US" sz="2800" dirty="0" err="1"/>
+              <a:t>isoconversional</a:t>
+            </a:r>
+            <a:r>
+              <a:rPr lang="en-US" sz="2800" dirty="0"/>
+              <a:t> methods: </a:t>
+            </a:r>
+            <a:r>
+              <a:rPr lang="en-US" sz="2800" dirty="0" smtClean="0"/>
+              <a:t>complex mechanisms </a:t>
+            </a:r>
+            <a:r>
+              <a:rPr lang="en-US" sz="2800" dirty="0"/>
+              <a:t>and isothermal predicted conversion–time curves." </a:t>
+            </a:r>
+            <a:r>
+              <a:rPr lang="en-US" sz="2800" i="1" dirty="0" err="1"/>
+              <a:t>Chemometrics</a:t>
+            </a:r>
+            <a:r>
+              <a:rPr lang="en-US" sz="2800" i="1" dirty="0"/>
+              <a:t> and Intelligent </a:t>
+            </a:r>
+            <a:r>
+              <a:rPr lang="en-US" sz="2800" i="1" dirty="0" smtClean="0"/>
+              <a:t>Laboratory Systems </a:t>
+            </a:r>
+            <a:r>
+              <a:rPr lang="en-US" sz="2800" dirty="0"/>
+              <a:t>96.2 (2009): 219-226.</a:t>
+            </a:r>
+            <a:endParaRPr lang="en-US" sz="2800" dirty="0" smtClean="0"/>
+          </a:p>
+        </p:txBody>
+      </p:sp>
+      <p:cxnSp>
+        <p:nvCxnSpPr>
+          <p:cNvPr id="9" name="Straight Connector 8"/>
+          <p:cNvCxnSpPr/>
+          <p:nvPr/>
+        </p:nvCxnSpPr>
+        <p:spPr>
+          <a:xfrm>
+            <a:off x="1024467" y="2192867"/>
+            <a:ext cx="9508066" cy="0"/>
+          </a:xfrm>
+          <a:prstGeom prst="line">
+            <a:avLst/>
+          </a:prstGeom>
+          <a:ln w="38100"/>
+        </p:spPr>
+        <p:style>
+          <a:lnRef idx="1">
+            <a:schemeClr val="accent1"/>
+          </a:lnRef>
+          <a:fillRef idx="0">
+            <a:schemeClr val="accent1"/>
+          </a:fillRef>
+          <a:effectRef idx="0">
+            <a:schemeClr val="accent1"/>
+          </a:effectRef>
+          <a:fontRef idx="minor">
+            <a:schemeClr val="tx1"/>
+          </a:fontRef>
+        </p:style>
+      </p:cxnSp>
+    </p:spTree>
+    <p:extLst>
+      <p:ext uri="{BB962C8B-B14F-4D97-AF65-F5344CB8AC3E}">
+        <p14:creationId xmlns:p14="http://schemas.microsoft.com/office/powerpoint/2010/main" val="1619127113"/>
+      </p:ext>
+    </p:extLst>
+  </p:cSld>
+  <p:clrMapOvr>
+    <a:masterClrMapping/>
+  </p:clrMapOvr>
+</p:sld>
+</file>
+
+<file path=ppt/slides/slide25.xml><?xml version="1.0" encoding="utf-8"?>
+<p:sld xmlns:a="http://schemas.openxmlformats.org/drawingml/2006/main" xmlns:r="http://schemas.openxmlformats.org/officeDocument/2006/relationships" xmlns:p="http://schemas.openxmlformats.org/presentationml/2006/main">
+  <p:cSld>
+    <p:spTree>
+      <p:nvGrpSpPr>
+        <p:cNvPr id="1" name=""/>
+        <p:cNvGrpSpPr/>
+        <p:nvPr/>
+      </p:nvGrpSpPr>
+      <p:grpSpPr>
+        <a:xfrm>
+          <a:off x="0" y="0"/>
+          <a:ext cx="0" cy="0"/>
+          <a:chOff x="0" y="0"/>
+          <a:chExt cx="0" cy="0"/>
+        </a:xfrm>
+      </p:grpSpPr>
+      <p:sp>
+        <p:nvSpPr>
+          <p:cNvPr id="6" name="TextBox 5"/>
+          <p:cNvSpPr txBox="1"/>
+          <p:nvPr/>
+        </p:nvSpPr>
+        <p:spPr>
+          <a:xfrm>
+            <a:off x="1202267" y="889000"/>
+            <a:ext cx="8737600" cy="1200329"/>
+          </a:xfrm>
+          <a:prstGeom prst="rect">
+            <a:avLst/>
+          </a:prstGeom>
+          <a:noFill/>
+        </p:spPr>
+        <p:txBody>
+          <a:bodyPr wrap="square" rtlCol="0">
+            <a:spAutoFit/>
+          </a:bodyPr>
+          <a:lstStyle/>
+          <a:p>
+            <a:pPr algn="ctr"/>
+            <a:r>
+              <a:rPr lang="en-US" sz="7200" dirty="0" smtClean="0"/>
+              <a:t>Questions?</a:t>
+            </a:r>
+            <a:endParaRPr lang="en-US" sz="7200" dirty="0"/>
+          </a:p>
+        </p:txBody>
+      </p:sp>
+      <p:sp>
+        <p:nvSpPr>
+          <p:cNvPr id="7" name="TextBox 6"/>
+          <p:cNvSpPr txBox="1"/>
+          <p:nvPr/>
+        </p:nvSpPr>
+        <p:spPr>
+          <a:xfrm>
+            <a:off x="1769534" y="2802467"/>
+            <a:ext cx="1354666" cy="923330"/>
+          </a:xfrm>
+          <a:prstGeom prst="rect">
+            <a:avLst/>
+          </a:prstGeom>
+          <a:noFill/>
+        </p:spPr>
+        <p:txBody>
+          <a:bodyPr wrap="square" rtlCol="0">
+            <a:spAutoFit/>
+          </a:bodyPr>
+          <a:lstStyle/>
+          <a:p>
+            <a:pPr marL="228600" indent="-228600"/>
+            <a:r>
+              <a:rPr lang="en-US" sz="5400" dirty="0" smtClean="0"/>
+              <a:t>?</a:t>
+            </a:r>
+            <a:endParaRPr lang="en-US" sz="5400" dirty="0" smtClean="0"/>
+          </a:p>
+        </p:txBody>
+      </p:sp>
+      <p:cxnSp>
+        <p:nvCxnSpPr>
+          <p:cNvPr id="9" name="Straight Connector 8"/>
+          <p:cNvCxnSpPr/>
+          <p:nvPr/>
+        </p:nvCxnSpPr>
+        <p:spPr>
+          <a:xfrm>
+            <a:off x="1024467" y="2192867"/>
+            <a:ext cx="9508066" cy="0"/>
+          </a:xfrm>
+          <a:prstGeom prst="line">
+            <a:avLst/>
+          </a:prstGeom>
+          <a:ln w="38100"/>
+        </p:spPr>
+        <p:style>
+          <a:lnRef idx="1">
+            <a:schemeClr val="accent1"/>
+          </a:lnRef>
+          <a:fillRef idx="0">
+            <a:schemeClr val="accent1"/>
+          </a:fillRef>
+          <a:effectRef idx="0">
+            <a:schemeClr val="accent1"/>
+          </a:effectRef>
+          <a:fontRef idx="minor">
+            <a:schemeClr val="tx1"/>
+          </a:fontRef>
+        </p:style>
+      </p:cxnSp>
+      <p:sp>
+        <p:nvSpPr>
+          <p:cNvPr id="5" name="TextBox 4"/>
+          <p:cNvSpPr txBox="1"/>
+          <p:nvPr/>
+        </p:nvSpPr>
+        <p:spPr>
+          <a:xfrm>
+            <a:off x="3767667" y="4038600"/>
+            <a:ext cx="1354666" cy="923330"/>
+          </a:xfrm>
+          <a:prstGeom prst="rect">
+            <a:avLst/>
+          </a:prstGeom>
+          <a:noFill/>
+        </p:spPr>
+        <p:txBody>
+          <a:bodyPr wrap="square" rtlCol="0">
+            <a:spAutoFit/>
+          </a:bodyPr>
+          <a:lstStyle/>
+          <a:p>
+            <a:pPr marL="228600" indent="-228600"/>
+            <a:r>
+              <a:rPr lang="en-US" sz="5400" dirty="0" smtClean="0"/>
+              <a:t>?</a:t>
+            </a:r>
+            <a:endParaRPr lang="en-US" sz="5400" dirty="0" smtClean="0"/>
+          </a:p>
+        </p:txBody>
+      </p:sp>
+      <p:sp>
+        <p:nvSpPr>
+          <p:cNvPr id="8" name="TextBox 7"/>
+          <p:cNvSpPr txBox="1"/>
+          <p:nvPr/>
+        </p:nvSpPr>
+        <p:spPr>
+          <a:xfrm>
+            <a:off x="5943601" y="2550530"/>
+            <a:ext cx="1354666" cy="923330"/>
+          </a:xfrm>
+          <a:prstGeom prst="rect">
+            <a:avLst/>
+          </a:prstGeom>
+          <a:noFill/>
+        </p:spPr>
+        <p:txBody>
+          <a:bodyPr wrap="square" rtlCol="0">
+            <a:spAutoFit/>
+          </a:bodyPr>
+          <a:lstStyle/>
+          <a:p>
+            <a:pPr marL="228600" indent="-228600"/>
+            <a:r>
+              <a:rPr lang="en-US" sz="5400" dirty="0" smtClean="0"/>
+              <a:t>?</a:t>
+            </a:r>
+            <a:endParaRPr lang="en-US" sz="5400" dirty="0" smtClean="0"/>
+          </a:p>
+        </p:txBody>
+      </p:sp>
+      <p:sp>
+        <p:nvSpPr>
+          <p:cNvPr id="10" name="TextBox 9"/>
+          <p:cNvSpPr txBox="1"/>
+          <p:nvPr/>
+        </p:nvSpPr>
+        <p:spPr>
+          <a:xfrm>
+            <a:off x="7222067" y="4981390"/>
+            <a:ext cx="1354666" cy="923330"/>
+          </a:xfrm>
+          <a:prstGeom prst="rect">
+            <a:avLst/>
+          </a:prstGeom>
+          <a:noFill/>
+        </p:spPr>
+        <p:txBody>
+          <a:bodyPr wrap="square" rtlCol="0">
+            <a:spAutoFit/>
+          </a:bodyPr>
+          <a:lstStyle/>
+          <a:p>
+            <a:pPr marL="228600" indent="-228600"/>
+            <a:r>
+              <a:rPr lang="en-US" sz="5400" dirty="0" smtClean="0"/>
+              <a:t>?</a:t>
+            </a:r>
+            <a:endParaRPr lang="en-US" sz="5400" dirty="0" smtClean="0"/>
+          </a:p>
+        </p:txBody>
+      </p:sp>
+      <p:sp>
+        <p:nvSpPr>
+          <p:cNvPr id="11" name="TextBox 10"/>
+          <p:cNvSpPr txBox="1"/>
+          <p:nvPr/>
+        </p:nvSpPr>
+        <p:spPr>
+          <a:xfrm>
+            <a:off x="9025467" y="3605788"/>
+            <a:ext cx="1354666" cy="923330"/>
+          </a:xfrm>
+          <a:prstGeom prst="rect">
+            <a:avLst/>
+          </a:prstGeom>
+          <a:noFill/>
+        </p:spPr>
+        <p:txBody>
+          <a:bodyPr wrap="square" rtlCol="0">
+            <a:spAutoFit/>
+          </a:bodyPr>
+          <a:lstStyle/>
+          <a:p>
+            <a:pPr marL="228600" indent="-228600"/>
+            <a:r>
+              <a:rPr lang="en-US" sz="5400" dirty="0" smtClean="0"/>
+              <a:t>?</a:t>
+            </a:r>
+            <a:endParaRPr lang="en-US" sz="5400" dirty="0" smtClean="0"/>
+          </a:p>
+        </p:txBody>
+      </p:sp>
+    </p:spTree>
+    <p:extLst>
+      <p:ext uri="{BB962C8B-B14F-4D97-AF65-F5344CB8AC3E}">
+        <p14:creationId xmlns:p14="http://schemas.microsoft.com/office/powerpoint/2010/main" val="3447623503"/>
       </p:ext>
     </p:extLst>
   </p:cSld>

</xml_diff>